<commit_message>
BUGS fix and addition of console to word and ppt
</commit_message>
<xml_diff>
--- a/Ex00/ClassChart.pptx
+++ b/Ex00/ClassChart.pptx
@@ -6,6 +6,7 @@
   </p:sldMasterIdLst>
   <p:sldIdLst>
     <p:sldId id="256" r:id="rId2"/>
+    <p:sldId id="257" r:id="rId3"/>
   </p:sldIdLst>
   <p:sldSz cx="12192000" cy="6858000"/>
   <p:notesSz cx="6858000" cy="9144000"/>
@@ -104,6 +105,11 @@
       </a:defRPr>
     </a:lvl9pPr>
   </p:defaultTextStyle>
+  <p:extLst>
+    <p:ext uri="{EFAFB233-063F-42B5-8137-9DF3F51BA10A}">
+      <p15:sldGuideLst xmlns:p15="http://schemas.microsoft.com/office/powerpoint/2012/main"/>
+    </p:ext>
+  </p:extLst>
 </p:presentation>
 </file>
 
@@ -238,7 +244,7 @@
           <a:p>
             <a:fld id="{5BDA905A-DB9B-4E79-B154-D6AA78A56516}" type="datetimeFigureOut">
               <a:rPr lang="he-IL" smtClean="0"/>
-              <a:t>ט"ו/חשון/תשע"ה</a:t>
+              <a:t>י"ח/חשון/תשע"ה</a:t>
             </a:fld>
             <a:endParaRPr lang="he-IL"/>
           </a:p>
@@ -408,7 +414,7 @@
           <a:p>
             <a:fld id="{5BDA905A-DB9B-4E79-B154-D6AA78A56516}" type="datetimeFigureOut">
               <a:rPr lang="he-IL" smtClean="0"/>
-              <a:t>ט"ו/חשון/תשע"ה</a:t>
+              <a:t>י"ח/חשון/תשע"ה</a:t>
             </a:fld>
             <a:endParaRPr lang="he-IL"/>
           </a:p>
@@ -588,7 +594,7 @@
           <a:p>
             <a:fld id="{5BDA905A-DB9B-4E79-B154-D6AA78A56516}" type="datetimeFigureOut">
               <a:rPr lang="he-IL" smtClean="0"/>
-              <a:t>ט"ו/חשון/תשע"ה</a:t>
+              <a:t>י"ח/חשון/תשע"ה</a:t>
             </a:fld>
             <a:endParaRPr lang="he-IL"/>
           </a:p>
@@ -758,7 +764,7 @@
           <a:p>
             <a:fld id="{5BDA905A-DB9B-4E79-B154-D6AA78A56516}" type="datetimeFigureOut">
               <a:rPr lang="he-IL" smtClean="0"/>
-              <a:t>ט"ו/חשון/תשע"ה</a:t>
+              <a:t>י"ח/חשון/תשע"ה</a:t>
             </a:fld>
             <a:endParaRPr lang="he-IL"/>
           </a:p>
@@ -1004,7 +1010,7 @@
           <a:p>
             <a:fld id="{5BDA905A-DB9B-4E79-B154-D6AA78A56516}" type="datetimeFigureOut">
               <a:rPr lang="he-IL" smtClean="0"/>
-              <a:t>ט"ו/חשון/תשע"ה</a:t>
+              <a:t>י"ח/חשון/תשע"ה</a:t>
             </a:fld>
             <a:endParaRPr lang="he-IL"/>
           </a:p>
@@ -1236,7 +1242,7 @@
           <a:p>
             <a:fld id="{5BDA905A-DB9B-4E79-B154-D6AA78A56516}" type="datetimeFigureOut">
               <a:rPr lang="he-IL" smtClean="0"/>
-              <a:t>ט"ו/חשון/תשע"ה</a:t>
+              <a:t>י"ח/חשון/תשע"ה</a:t>
             </a:fld>
             <a:endParaRPr lang="he-IL"/>
           </a:p>
@@ -1603,7 +1609,7 @@
           <a:p>
             <a:fld id="{5BDA905A-DB9B-4E79-B154-D6AA78A56516}" type="datetimeFigureOut">
               <a:rPr lang="he-IL" smtClean="0"/>
-              <a:t>ט"ו/חשון/תשע"ה</a:t>
+              <a:t>י"ח/חשון/תשע"ה</a:t>
             </a:fld>
             <a:endParaRPr lang="he-IL"/>
           </a:p>
@@ -1721,7 +1727,7 @@
           <a:p>
             <a:fld id="{5BDA905A-DB9B-4E79-B154-D6AA78A56516}" type="datetimeFigureOut">
               <a:rPr lang="he-IL" smtClean="0"/>
-              <a:t>ט"ו/חשון/תשע"ה</a:t>
+              <a:t>י"ח/חשון/תשע"ה</a:t>
             </a:fld>
             <a:endParaRPr lang="he-IL"/>
           </a:p>
@@ -1816,7 +1822,7 @@
           <a:p>
             <a:fld id="{5BDA905A-DB9B-4E79-B154-D6AA78A56516}" type="datetimeFigureOut">
               <a:rPr lang="he-IL" smtClean="0"/>
-              <a:t>ט"ו/חשון/תשע"ה</a:t>
+              <a:t>י"ח/חשון/תשע"ה</a:t>
             </a:fld>
             <a:endParaRPr lang="he-IL"/>
           </a:p>
@@ -2093,7 +2099,7 @@
           <a:p>
             <a:fld id="{5BDA905A-DB9B-4E79-B154-D6AA78A56516}" type="datetimeFigureOut">
               <a:rPr lang="he-IL" smtClean="0"/>
-              <a:t>ט"ו/חשון/תשע"ה</a:t>
+              <a:t>י"ח/חשון/תשע"ה</a:t>
             </a:fld>
             <a:endParaRPr lang="he-IL"/>
           </a:p>
@@ -2346,7 +2352,7 @@
           <a:p>
             <a:fld id="{5BDA905A-DB9B-4E79-B154-D6AA78A56516}" type="datetimeFigureOut">
               <a:rPr lang="he-IL" smtClean="0"/>
-              <a:t>ט"ו/חשון/תשע"ה</a:t>
+              <a:t>י"ח/חשון/תשע"ה</a:t>
             </a:fld>
             <a:endParaRPr lang="he-IL"/>
           </a:p>
@@ -2559,7 +2565,7 @@
           <a:p>
             <a:fld id="{5BDA905A-DB9B-4E79-B154-D6AA78A56516}" type="datetimeFigureOut">
               <a:rPr lang="he-IL" smtClean="0"/>
-              <a:t>ט"ו/חשון/תשע"ה</a:t>
+              <a:t>י"ח/חשון/תשע"ה</a:t>
             </a:fld>
             <a:endParaRPr lang="he-IL"/>
           </a:p>
@@ -5747,6 +5753,103 @@
           </a:fontRef>
         </p:style>
       </p:cxnSp>
+      <p:sp>
+        <p:nvSpPr>
+          <p:cNvPr id="61" name="Rectangle 291"/>
+          <p:cNvSpPr/>
+          <p:nvPr/>
+        </p:nvSpPr>
+        <p:spPr>
+          <a:xfrm>
+            <a:off x="7198586" y="5037765"/>
+            <a:ext cx="1989425" cy="325807"/>
+          </a:xfrm>
+          <a:prstGeom prst="rect">
+            <a:avLst/>
+          </a:prstGeom>
+          <a:noFill/>
+          <a:ln w="25400">
+            <a:solidFill>
+              <a:schemeClr val="tx1"/>
+            </a:solidFill>
+          </a:ln>
+        </p:spPr>
+        <p:style>
+          <a:lnRef idx="2">
+            <a:schemeClr val="accent1">
+              <a:shade val="50000"/>
+            </a:schemeClr>
+          </a:lnRef>
+          <a:fillRef idx="1">
+            <a:schemeClr val="accent1"/>
+          </a:fillRef>
+          <a:effectRef idx="0">
+            <a:schemeClr val="accent1"/>
+          </a:effectRef>
+          <a:fontRef idx="minor">
+            <a:schemeClr val="lt1"/>
+          </a:fontRef>
+        </p:style>
+        <p:txBody>
+          <a:bodyPr rtlCol="1" anchor="ctr"/>
+          <a:lstStyle/>
+          <a:p>
+            <a:pPr algn="ctr"/>
+            <a:r>
+              <a:rPr lang="en-US" sz="1200" dirty="0" err="1">
+                <a:solidFill>
+                  <a:schemeClr val="tx1"/>
+                </a:solidFill>
+              </a:rPr>
+              <a:t>ICommunicateWithConsole</a:t>
+            </a:r>
+            <a:endParaRPr lang="he-IL" sz="1200" dirty="0">
+              <a:solidFill>
+                <a:schemeClr val="tx1"/>
+              </a:solidFill>
+            </a:endParaRPr>
+          </a:p>
+        </p:txBody>
+      </p:sp>
+      <p:cxnSp>
+        <p:nvCxnSpPr>
+          <p:cNvPr id="63" name="Straight Connector 41"/>
+          <p:cNvCxnSpPr>
+            <a:stCxn id="292" idx="3"/>
+            <a:endCxn id="61" idx="1"/>
+          </p:cNvCxnSpPr>
+          <p:nvPr/>
+        </p:nvCxnSpPr>
+        <p:spPr>
+          <a:xfrm flipV="1">
+            <a:off x="6985555" y="5200669"/>
+            <a:ext cx="213031" cy="1"/>
+          </a:xfrm>
+          <a:prstGeom prst="line">
+            <a:avLst/>
+          </a:prstGeom>
+          <a:ln w="19050">
+            <a:solidFill>
+              <a:schemeClr val="tx1"/>
+            </a:solidFill>
+            <a:prstDash val="sysDot"/>
+          </a:ln>
+        </p:spPr>
+        <p:style>
+          <a:lnRef idx="1">
+            <a:schemeClr val="accent1"/>
+          </a:lnRef>
+          <a:fillRef idx="0">
+            <a:schemeClr val="accent1"/>
+          </a:fillRef>
+          <a:effectRef idx="0">
+            <a:schemeClr val="accent1"/>
+          </a:effectRef>
+          <a:fontRef idx="minor">
+            <a:schemeClr val="tx1"/>
+          </a:fontRef>
+        </p:style>
+      </p:cxnSp>
     </p:spTree>
     <p:extLst>
       <p:ext uri="{BB962C8B-B14F-4D97-AF65-F5344CB8AC3E}">
@@ -5757,6 +5860,1716 @@
   <p:clrMapOvr>
     <a:masterClrMapping/>
   </p:clrMapOvr>
+  <p:timing>
+    <p:tnLst>
+      <p:par>
+        <p:cTn id="1" dur="indefinite" restart="never" nodeType="tmRoot"/>
+      </p:par>
+    </p:tnLst>
+  </p:timing>
+</p:sld>
+</file>
+
+<file path=ppt/slides/slide2.xml><?xml version="1.0" encoding="utf-8"?>
+<p:sld xmlns:a="http://schemas.openxmlformats.org/drawingml/2006/main" xmlns:r="http://schemas.openxmlformats.org/officeDocument/2006/relationships" xmlns:p="http://schemas.openxmlformats.org/presentationml/2006/main">
+  <p:cSld>
+    <p:spTree>
+      <p:nvGrpSpPr>
+        <p:cNvPr id="1" name=""/>
+        <p:cNvGrpSpPr/>
+        <p:nvPr/>
+      </p:nvGrpSpPr>
+      <p:grpSpPr>
+        <a:xfrm>
+          <a:off x="0" y="0"/>
+          <a:ext cx="0" cy="0"/>
+          <a:chOff x="0" y="0"/>
+          <a:chExt cx="0" cy="0"/>
+        </a:xfrm>
+      </p:grpSpPr>
+      <p:sp>
+        <p:nvSpPr>
+          <p:cNvPr id="4" name="Rectangle 3"/>
+          <p:cNvSpPr/>
+          <p:nvPr/>
+        </p:nvSpPr>
+        <p:spPr>
+          <a:xfrm>
+            <a:off x="4108611" y="3365822"/>
+            <a:ext cx="2060284" cy="270727"/>
+          </a:xfrm>
+          <a:prstGeom prst="rect">
+            <a:avLst/>
+          </a:prstGeom>
+          <a:noFill/>
+          <a:ln w="25400">
+            <a:solidFill>
+              <a:schemeClr val="tx1"/>
+            </a:solidFill>
+          </a:ln>
+        </p:spPr>
+        <p:style>
+          <a:lnRef idx="2">
+            <a:schemeClr val="accent1">
+              <a:shade val="50000"/>
+            </a:schemeClr>
+          </a:lnRef>
+          <a:fillRef idx="1">
+            <a:schemeClr val="accent1"/>
+          </a:fillRef>
+          <a:effectRef idx="0">
+            <a:schemeClr val="accent1"/>
+          </a:effectRef>
+          <a:fontRef idx="minor">
+            <a:schemeClr val="lt1"/>
+          </a:fontRef>
+        </p:style>
+        <p:txBody>
+          <a:bodyPr rtlCol="1" anchor="ctr"/>
+          <a:lstStyle/>
+          <a:p>
+            <a:pPr algn="ctr"/>
+            <a:r>
+              <a:rPr lang="en-US" sz="1200" dirty="0" err="1">
+                <a:solidFill>
+                  <a:schemeClr val="tx1"/>
+                </a:solidFill>
+              </a:rPr>
+              <a:t>GarageManagmentMainPage</a:t>
+            </a:r>
+            <a:r>
+              <a:rPr lang="en-US" sz="1200" dirty="0">
+                <a:solidFill>
+                  <a:schemeClr val="tx1"/>
+                </a:solidFill>
+              </a:rPr>
+              <a:t> </a:t>
+            </a:r>
+            <a:endParaRPr lang="he-IL" sz="1200" dirty="0">
+              <a:solidFill>
+                <a:schemeClr val="tx1"/>
+              </a:solidFill>
+            </a:endParaRPr>
+          </a:p>
+        </p:txBody>
+      </p:sp>
+      <p:sp>
+        <p:nvSpPr>
+          <p:cNvPr id="5" name="Rounded Rectangle 5"/>
+          <p:cNvSpPr/>
+          <p:nvPr/>
+        </p:nvSpPr>
+        <p:spPr>
+          <a:xfrm>
+            <a:off x="5482248" y="1317528"/>
+            <a:ext cx="1464853" cy="445002"/>
+          </a:xfrm>
+          <a:prstGeom prst="roundRect">
+            <a:avLst/>
+          </a:prstGeom>
+          <a:noFill/>
+          <a:ln w="25400">
+            <a:solidFill>
+              <a:schemeClr val="tx1"/>
+            </a:solidFill>
+          </a:ln>
+        </p:spPr>
+        <p:style>
+          <a:lnRef idx="2">
+            <a:schemeClr val="accent1">
+              <a:shade val="50000"/>
+            </a:schemeClr>
+          </a:lnRef>
+          <a:fillRef idx="1">
+            <a:schemeClr val="accent1"/>
+          </a:fillRef>
+          <a:effectRef idx="0">
+            <a:schemeClr val="accent1"/>
+          </a:effectRef>
+          <a:fontRef idx="minor">
+            <a:schemeClr val="lt1"/>
+          </a:fontRef>
+        </p:style>
+        <p:txBody>
+          <a:bodyPr rot="0" spcFirstLastPara="0" vertOverflow="overflow" horzOverflow="overflow" vert="horz" wrap="square" lIns="91440" tIns="45720" rIns="91440" bIns="45720" numCol="1" spcCol="0" rtlCol="1" fromWordArt="0" anchor="ctr" anchorCtr="0" forceAA="0" compatLnSpc="1">
+            <a:prstTxWarp prst="textNoShape">
+              <a:avLst/>
+            </a:prstTxWarp>
+            <a:noAutofit/>
+          </a:bodyPr>
+          <a:lstStyle/>
+          <a:p>
+            <a:pPr algn="ctr"/>
+            <a:r>
+              <a:rPr lang="en-US" sz="1200" dirty="0" err="1">
+                <a:solidFill>
+                  <a:schemeClr val="tx1"/>
+                </a:solidFill>
+              </a:rPr>
+              <a:t>ConsoleAppPage</a:t>
+            </a:r>
+            <a:r>
+              <a:rPr lang="en-US" sz="1200" dirty="0">
+                <a:solidFill>
+                  <a:schemeClr val="tx1"/>
+                </a:solidFill>
+              </a:rPr>
+              <a:t> </a:t>
+            </a:r>
+            <a:endParaRPr lang="he-IL" sz="1200" dirty="0" smtClean="0">
+              <a:solidFill>
+                <a:schemeClr val="tx1"/>
+              </a:solidFill>
+            </a:endParaRPr>
+          </a:p>
+        </p:txBody>
+      </p:sp>
+      <p:sp>
+        <p:nvSpPr>
+          <p:cNvPr id="9" name="Rectangle 11"/>
+          <p:cNvSpPr/>
+          <p:nvPr/>
+        </p:nvSpPr>
+        <p:spPr>
+          <a:xfrm>
+            <a:off x="5806836" y="2463290"/>
+            <a:ext cx="1884527" cy="276673"/>
+          </a:xfrm>
+          <a:prstGeom prst="rect">
+            <a:avLst/>
+          </a:prstGeom>
+          <a:noFill/>
+          <a:ln w="25400">
+            <a:solidFill>
+              <a:schemeClr val="tx1"/>
+            </a:solidFill>
+          </a:ln>
+        </p:spPr>
+        <p:style>
+          <a:lnRef idx="2">
+            <a:schemeClr val="accent1">
+              <a:shade val="50000"/>
+            </a:schemeClr>
+          </a:lnRef>
+          <a:fillRef idx="1">
+            <a:schemeClr val="accent1"/>
+          </a:fillRef>
+          <a:effectRef idx="0">
+            <a:schemeClr val="accent1"/>
+          </a:effectRef>
+          <a:fontRef idx="minor">
+            <a:schemeClr val="lt1"/>
+          </a:fontRef>
+        </p:style>
+        <p:txBody>
+          <a:bodyPr rtlCol="1" anchor="ctr"/>
+          <a:lstStyle/>
+          <a:p>
+            <a:pPr algn="ctr"/>
+            <a:r>
+              <a:rPr lang="en-US" sz="1200" dirty="0" err="1">
+                <a:solidFill>
+                  <a:schemeClr val="tx1"/>
+                </a:solidFill>
+              </a:rPr>
+              <a:t>DisplayGarageEntriesPage</a:t>
+            </a:r>
+            <a:r>
+              <a:rPr lang="en-US" sz="1200" dirty="0">
+                <a:solidFill>
+                  <a:schemeClr val="tx1"/>
+                </a:solidFill>
+              </a:rPr>
+              <a:t> </a:t>
+            </a:r>
+            <a:endParaRPr lang="he-IL" sz="1200" dirty="0">
+              <a:solidFill>
+                <a:schemeClr val="tx1"/>
+              </a:solidFill>
+            </a:endParaRPr>
+          </a:p>
+        </p:txBody>
+      </p:sp>
+      <p:sp>
+        <p:nvSpPr>
+          <p:cNvPr id="10" name="Rounded Rectangle 12"/>
+          <p:cNvSpPr/>
+          <p:nvPr/>
+        </p:nvSpPr>
+        <p:spPr>
+          <a:xfrm>
+            <a:off x="7355386" y="1837431"/>
+            <a:ext cx="1548916" cy="249930"/>
+          </a:xfrm>
+          <a:prstGeom prst="roundRect">
+            <a:avLst/>
+          </a:prstGeom>
+          <a:noFill/>
+          <a:ln w="25400">
+            <a:solidFill>
+              <a:schemeClr val="tx1"/>
+            </a:solidFill>
+          </a:ln>
+        </p:spPr>
+        <p:style>
+          <a:lnRef idx="2">
+            <a:schemeClr val="accent1">
+              <a:shade val="50000"/>
+            </a:schemeClr>
+          </a:lnRef>
+          <a:fillRef idx="1">
+            <a:schemeClr val="accent1"/>
+          </a:fillRef>
+          <a:effectRef idx="0">
+            <a:schemeClr val="accent1"/>
+          </a:effectRef>
+          <a:fontRef idx="minor">
+            <a:schemeClr val="lt1"/>
+          </a:fontRef>
+        </p:style>
+        <p:txBody>
+          <a:bodyPr rot="0" spcFirstLastPara="0" vertOverflow="overflow" horzOverflow="overflow" vert="horz" wrap="square" lIns="91440" tIns="45720" rIns="91440" bIns="45720" numCol="1" spcCol="0" rtlCol="1" fromWordArt="0" anchor="ctr" anchorCtr="0" forceAA="0" compatLnSpc="1">
+            <a:prstTxWarp prst="textNoShape">
+              <a:avLst/>
+            </a:prstTxWarp>
+            <a:noAutofit/>
+          </a:bodyPr>
+          <a:lstStyle/>
+          <a:p>
+            <a:pPr algn="ctr"/>
+            <a:r>
+              <a:rPr lang="en-US" sz="1200" dirty="0" err="1">
+                <a:solidFill>
+                  <a:schemeClr val="tx1"/>
+                </a:solidFill>
+              </a:rPr>
+              <a:t>ChangeStatePage</a:t>
+            </a:r>
+            <a:r>
+              <a:rPr lang="en-US" sz="1200" dirty="0">
+                <a:solidFill>
+                  <a:schemeClr val="tx1"/>
+                </a:solidFill>
+              </a:rPr>
+              <a:t> </a:t>
+            </a:r>
+            <a:endParaRPr lang="he-IL" sz="1200" dirty="0" smtClean="0">
+              <a:solidFill>
+                <a:schemeClr val="tx1"/>
+              </a:solidFill>
+            </a:endParaRPr>
+          </a:p>
+        </p:txBody>
+      </p:sp>
+      <p:sp>
+        <p:nvSpPr>
+          <p:cNvPr id="13" name="Rounded Rectangle 15"/>
+          <p:cNvSpPr/>
+          <p:nvPr/>
+        </p:nvSpPr>
+        <p:spPr>
+          <a:xfrm>
+            <a:off x="1399416" y="931215"/>
+            <a:ext cx="1806131" cy="217904"/>
+          </a:xfrm>
+          <a:prstGeom prst="roundRect">
+            <a:avLst/>
+          </a:prstGeom>
+          <a:noFill/>
+          <a:ln w="25400">
+            <a:solidFill>
+              <a:schemeClr val="tx1"/>
+            </a:solidFill>
+          </a:ln>
+        </p:spPr>
+        <p:style>
+          <a:lnRef idx="2">
+            <a:schemeClr val="accent1">
+              <a:shade val="50000"/>
+            </a:schemeClr>
+          </a:lnRef>
+          <a:fillRef idx="1">
+            <a:schemeClr val="accent1"/>
+          </a:fillRef>
+          <a:effectRef idx="0">
+            <a:schemeClr val="accent1"/>
+          </a:effectRef>
+          <a:fontRef idx="minor">
+            <a:schemeClr val="lt1"/>
+          </a:fontRef>
+        </p:style>
+        <p:txBody>
+          <a:bodyPr rot="0" spcFirstLastPara="0" vertOverflow="overflow" horzOverflow="overflow" vert="horz" wrap="square" lIns="91440" tIns="45720" rIns="91440" bIns="45720" numCol="1" spcCol="0" rtlCol="1" fromWordArt="0" anchor="ctr" anchorCtr="0" forceAA="0" compatLnSpc="1">
+            <a:prstTxWarp prst="textNoShape">
+              <a:avLst/>
+            </a:prstTxWarp>
+            <a:noAutofit/>
+          </a:bodyPr>
+          <a:lstStyle/>
+          <a:p>
+            <a:pPr algn="ctr"/>
+            <a:r>
+              <a:rPr lang="en-US" sz="1200" dirty="0" err="1">
+                <a:solidFill>
+                  <a:schemeClr val="tx1"/>
+                </a:solidFill>
+              </a:rPr>
+              <a:t>VehicleAlreadyExistsPage</a:t>
+            </a:r>
+            <a:endParaRPr lang="he-IL" sz="1200" dirty="0" smtClean="0">
+              <a:solidFill>
+                <a:schemeClr val="tx1"/>
+              </a:solidFill>
+            </a:endParaRPr>
+          </a:p>
+        </p:txBody>
+      </p:sp>
+      <p:sp>
+        <p:nvSpPr>
+          <p:cNvPr id="16" name="Rounded Rectangle 18"/>
+          <p:cNvSpPr/>
+          <p:nvPr/>
+        </p:nvSpPr>
+        <p:spPr>
+          <a:xfrm>
+            <a:off x="3838383" y="1779118"/>
+            <a:ext cx="1161248" cy="256647"/>
+          </a:xfrm>
+          <a:prstGeom prst="roundRect">
+            <a:avLst/>
+          </a:prstGeom>
+          <a:noFill/>
+          <a:ln w="25400">
+            <a:solidFill>
+              <a:schemeClr val="tx1"/>
+            </a:solidFill>
+          </a:ln>
+        </p:spPr>
+        <p:style>
+          <a:lnRef idx="2">
+            <a:schemeClr val="accent1">
+              <a:shade val="50000"/>
+            </a:schemeClr>
+          </a:lnRef>
+          <a:fillRef idx="1">
+            <a:schemeClr val="accent1"/>
+          </a:fillRef>
+          <a:effectRef idx="0">
+            <a:schemeClr val="accent1"/>
+          </a:effectRef>
+          <a:fontRef idx="minor">
+            <a:schemeClr val="lt1"/>
+          </a:fontRef>
+        </p:style>
+        <p:txBody>
+          <a:bodyPr rot="0" spcFirstLastPara="0" vertOverflow="overflow" horzOverflow="overflow" vert="horz" wrap="square" lIns="91440" tIns="45720" rIns="91440" bIns="45720" numCol="1" spcCol="0" rtlCol="1" fromWordArt="0" anchor="ctr" anchorCtr="0" forceAA="0" compatLnSpc="1">
+            <a:prstTxWarp prst="textNoShape">
+              <a:avLst/>
+            </a:prstTxWarp>
+            <a:noAutofit/>
+          </a:bodyPr>
+          <a:lstStyle/>
+          <a:p>
+            <a:pPr algn="ctr"/>
+            <a:r>
+              <a:rPr lang="en-US" sz="1200" dirty="0" err="1">
+                <a:solidFill>
+                  <a:schemeClr val="tx1"/>
+                </a:solidFill>
+              </a:rPr>
+              <a:t>MessagePage</a:t>
+            </a:r>
+            <a:r>
+              <a:rPr lang="en-US" sz="1200" dirty="0">
+                <a:solidFill>
+                  <a:schemeClr val="tx1"/>
+                </a:solidFill>
+              </a:rPr>
+              <a:t> </a:t>
+            </a:r>
+            <a:endParaRPr lang="he-IL" sz="1200" dirty="0" smtClean="0">
+              <a:solidFill>
+                <a:schemeClr val="tx1"/>
+              </a:solidFill>
+            </a:endParaRPr>
+          </a:p>
+        </p:txBody>
+      </p:sp>
+      <p:sp>
+        <p:nvSpPr>
+          <p:cNvPr id="21" name="Rectangle 26"/>
+          <p:cNvSpPr/>
+          <p:nvPr/>
+        </p:nvSpPr>
+        <p:spPr>
+          <a:xfrm>
+            <a:off x="9554115" y="785004"/>
+            <a:ext cx="1352578" cy="260132"/>
+          </a:xfrm>
+          <a:prstGeom prst="rect">
+            <a:avLst/>
+          </a:prstGeom>
+          <a:noFill/>
+          <a:ln w="25400">
+            <a:solidFill>
+              <a:schemeClr val="tx1"/>
+            </a:solidFill>
+          </a:ln>
+        </p:spPr>
+        <p:style>
+          <a:lnRef idx="2">
+            <a:schemeClr val="accent1">
+              <a:shade val="50000"/>
+            </a:schemeClr>
+          </a:lnRef>
+          <a:fillRef idx="1">
+            <a:schemeClr val="accent1"/>
+          </a:fillRef>
+          <a:effectRef idx="0">
+            <a:schemeClr val="accent1"/>
+          </a:effectRef>
+          <a:fontRef idx="minor">
+            <a:schemeClr val="lt1"/>
+          </a:fontRef>
+        </p:style>
+        <p:txBody>
+          <a:bodyPr rtlCol="1" anchor="ctr"/>
+          <a:lstStyle/>
+          <a:p>
+            <a:pPr algn="ctr"/>
+            <a:r>
+              <a:rPr lang="en-US" sz="1200" dirty="0" err="1">
+                <a:solidFill>
+                  <a:schemeClr val="tx1"/>
+                </a:solidFill>
+              </a:rPr>
+              <a:t>FillFuelPage</a:t>
+            </a:r>
+            <a:r>
+              <a:rPr lang="en-US" sz="1200" dirty="0">
+                <a:solidFill>
+                  <a:schemeClr val="tx1"/>
+                </a:solidFill>
+              </a:rPr>
+              <a:t> </a:t>
+            </a:r>
+            <a:endParaRPr lang="he-IL" sz="1200" dirty="0">
+              <a:solidFill>
+                <a:schemeClr val="tx1"/>
+              </a:solidFill>
+            </a:endParaRPr>
+          </a:p>
+        </p:txBody>
+      </p:sp>
+      <p:sp>
+        <p:nvSpPr>
+          <p:cNvPr id="22" name="Rounded Rectangle 27"/>
+          <p:cNvSpPr/>
+          <p:nvPr/>
+        </p:nvSpPr>
+        <p:spPr>
+          <a:xfrm>
+            <a:off x="10313534" y="340392"/>
+            <a:ext cx="1444058" cy="183046"/>
+          </a:xfrm>
+          <a:prstGeom prst="roundRect">
+            <a:avLst/>
+          </a:prstGeom>
+          <a:noFill/>
+          <a:ln w="25400">
+            <a:solidFill>
+              <a:schemeClr val="tx1"/>
+            </a:solidFill>
+          </a:ln>
+        </p:spPr>
+        <p:style>
+          <a:lnRef idx="2">
+            <a:schemeClr val="accent1">
+              <a:shade val="50000"/>
+            </a:schemeClr>
+          </a:lnRef>
+          <a:fillRef idx="1">
+            <a:schemeClr val="accent1"/>
+          </a:fillRef>
+          <a:effectRef idx="0">
+            <a:schemeClr val="accent1"/>
+          </a:effectRef>
+          <a:fontRef idx="minor">
+            <a:schemeClr val="lt1"/>
+          </a:fontRef>
+        </p:style>
+        <p:txBody>
+          <a:bodyPr rot="0" spcFirstLastPara="0" vertOverflow="overflow" horzOverflow="overflow" vert="horz" wrap="square" lIns="91440" tIns="45720" rIns="91440" bIns="45720" numCol="1" spcCol="0" rtlCol="1" fromWordArt="0" anchor="ctr" anchorCtr="0" forceAA="0" compatLnSpc="1">
+            <a:prstTxWarp prst="textNoShape">
+              <a:avLst/>
+            </a:prstTxWarp>
+            <a:noAutofit/>
+          </a:bodyPr>
+          <a:lstStyle/>
+          <a:p>
+            <a:pPr algn="ctr"/>
+            <a:r>
+              <a:rPr lang="en-US" sz="1200" dirty="0" err="1">
+                <a:solidFill>
+                  <a:schemeClr val="tx1"/>
+                </a:solidFill>
+              </a:rPr>
+              <a:t>ChargeBatteryPage</a:t>
+            </a:r>
+            <a:r>
+              <a:rPr lang="en-US" sz="1200" dirty="0">
+                <a:solidFill>
+                  <a:schemeClr val="tx1"/>
+                </a:solidFill>
+              </a:rPr>
+              <a:t> </a:t>
+            </a:r>
+            <a:endParaRPr lang="he-IL" sz="1200" dirty="0" smtClean="0">
+              <a:solidFill>
+                <a:schemeClr val="tx1"/>
+              </a:solidFill>
+            </a:endParaRPr>
+          </a:p>
+        </p:txBody>
+      </p:sp>
+      <p:sp>
+        <p:nvSpPr>
+          <p:cNvPr id="25" name="Rounded Rectangle 40"/>
+          <p:cNvSpPr/>
+          <p:nvPr/>
+        </p:nvSpPr>
+        <p:spPr>
+          <a:xfrm>
+            <a:off x="582422" y="322524"/>
+            <a:ext cx="2022376" cy="218783"/>
+          </a:xfrm>
+          <a:prstGeom prst="roundRect">
+            <a:avLst/>
+          </a:prstGeom>
+          <a:noFill/>
+          <a:ln w="25400">
+            <a:solidFill>
+              <a:schemeClr val="tx1"/>
+            </a:solidFill>
+          </a:ln>
+        </p:spPr>
+        <p:style>
+          <a:lnRef idx="2">
+            <a:schemeClr val="accent1">
+              <a:shade val="50000"/>
+            </a:schemeClr>
+          </a:lnRef>
+          <a:fillRef idx="1">
+            <a:schemeClr val="accent1"/>
+          </a:fillRef>
+          <a:effectRef idx="0">
+            <a:schemeClr val="accent1"/>
+          </a:effectRef>
+          <a:fontRef idx="minor">
+            <a:schemeClr val="lt1"/>
+          </a:fontRef>
+        </p:style>
+        <p:txBody>
+          <a:bodyPr rot="0" spcFirstLastPara="0" vertOverflow="overflow" horzOverflow="overflow" vert="horz" wrap="square" lIns="91440" tIns="45720" rIns="91440" bIns="45720" numCol="1" spcCol="0" rtlCol="1" fromWordArt="0" anchor="ctr" anchorCtr="0" forceAA="0" compatLnSpc="1">
+            <a:prstTxWarp prst="textNoShape">
+              <a:avLst/>
+            </a:prstTxWarp>
+            <a:noAutofit/>
+          </a:bodyPr>
+          <a:lstStyle/>
+          <a:p>
+            <a:pPr algn="ctr"/>
+            <a:r>
+              <a:rPr lang="en-US" sz="1200" dirty="0" err="1">
+                <a:solidFill>
+                  <a:schemeClr val="tx1"/>
+                </a:solidFill>
+              </a:rPr>
+              <a:t>DisplayVehicleFullInfoPage</a:t>
+            </a:r>
+            <a:r>
+              <a:rPr lang="en-US" sz="1200" dirty="0">
+                <a:solidFill>
+                  <a:schemeClr val="tx1"/>
+                </a:solidFill>
+              </a:rPr>
+              <a:t> </a:t>
+            </a:r>
+            <a:endParaRPr lang="he-IL" sz="1200" dirty="0" smtClean="0">
+              <a:solidFill>
+                <a:schemeClr val="tx1"/>
+              </a:solidFill>
+            </a:endParaRPr>
+          </a:p>
+        </p:txBody>
+      </p:sp>
+      <p:sp>
+        <p:nvSpPr>
+          <p:cNvPr id="27" name="Rounded Rectangle 44"/>
+          <p:cNvSpPr/>
+          <p:nvPr/>
+        </p:nvSpPr>
+        <p:spPr>
+          <a:xfrm>
+            <a:off x="8297539" y="1351782"/>
+            <a:ext cx="1659156" cy="286905"/>
+          </a:xfrm>
+          <a:prstGeom prst="roundRect">
+            <a:avLst/>
+          </a:prstGeom>
+          <a:noFill/>
+          <a:ln w="25400">
+            <a:solidFill>
+              <a:schemeClr val="tx1"/>
+            </a:solidFill>
+          </a:ln>
+        </p:spPr>
+        <p:style>
+          <a:lnRef idx="2">
+            <a:schemeClr val="accent1">
+              <a:shade val="50000"/>
+            </a:schemeClr>
+          </a:lnRef>
+          <a:fillRef idx="1">
+            <a:schemeClr val="accent1"/>
+          </a:fillRef>
+          <a:effectRef idx="0">
+            <a:schemeClr val="accent1"/>
+          </a:effectRef>
+          <a:fontRef idx="minor">
+            <a:schemeClr val="lt1"/>
+          </a:fontRef>
+        </p:style>
+        <p:txBody>
+          <a:bodyPr rot="0" spcFirstLastPara="0" vertOverflow="overflow" horzOverflow="overflow" vert="horz" wrap="square" lIns="91440" tIns="45720" rIns="91440" bIns="45720" numCol="1" spcCol="0" rtlCol="1" fromWordArt="0" anchor="ctr" anchorCtr="0" forceAA="0" compatLnSpc="1">
+            <a:prstTxWarp prst="textNoShape">
+              <a:avLst/>
+            </a:prstTxWarp>
+            <a:noAutofit/>
+          </a:bodyPr>
+          <a:lstStyle/>
+          <a:p>
+            <a:pPr algn="ctr"/>
+            <a:r>
+              <a:rPr lang="en-US" sz="1200" dirty="0" err="1">
+                <a:solidFill>
+                  <a:schemeClr val="tx1"/>
+                </a:solidFill>
+              </a:rPr>
+              <a:t>FillVehicleWheelsPage</a:t>
+            </a:r>
+            <a:r>
+              <a:rPr lang="en-US" sz="1200" dirty="0">
+                <a:solidFill>
+                  <a:schemeClr val="tx1"/>
+                </a:solidFill>
+              </a:rPr>
+              <a:t> </a:t>
+            </a:r>
+            <a:endParaRPr lang="he-IL" sz="1200" dirty="0" smtClean="0">
+              <a:solidFill>
+                <a:schemeClr val="tx1"/>
+              </a:solidFill>
+            </a:endParaRPr>
+          </a:p>
+        </p:txBody>
+      </p:sp>
+      <p:cxnSp>
+        <p:nvCxnSpPr>
+          <p:cNvPr id="29" name="Straight Arrow Connector 47"/>
+          <p:cNvCxnSpPr>
+            <a:stCxn id="5" idx="1"/>
+            <a:endCxn id="32" idx="3"/>
+          </p:cNvCxnSpPr>
+          <p:nvPr/>
+        </p:nvCxnSpPr>
+        <p:spPr>
+          <a:xfrm flipH="1" flipV="1">
+            <a:off x="3416983" y="1487851"/>
+            <a:ext cx="2065265" cy="52178"/>
+          </a:xfrm>
+          <a:prstGeom prst="straightConnector1">
+            <a:avLst/>
+          </a:prstGeom>
+          <a:ln w="19050">
+            <a:solidFill>
+              <a:schemeClr val="tx1"/>
+            </a:solidFill>
+            <a:prstDash val="dash"/>
+            <a:tailEnd type="triangle"/>
+          </a:ln>
+        </p:spPr>
+        <p:style>
+          <a:lnRef idx="1">
+            <a:schemeClr val="accent1"/>
+          </a:lnRef>
+          <a:fillRef idx="0">
+            <a:schemeClr val="accent1"/>
+          </a:fillRef>
+          <a:effectRef idx="0">
+            <a:schemeClr val="accent1"/>
+          </a:effectRef>
+          <a:fontRef idx="minor">
+            <a:schemeClr val="tx1"/>
+          </a:fontRef>
+        </p:style>
+      </p:cxnSp>
+      <p:cxnSp>
+        <p:nvCxnSpPr>
+          <p:cNvPr id="30" name="Straight Arrow Connector 56"/>
+          <p:cNvCxnSpPr>
+            <a:stCxn id="5" idx="2"/>
+            <a:endCxn id="10" idx="0"/>
+          </p:cNvCxnSpPr>
+          <p:nvPr/>
+        </p:nvCxnSpPr>
+        <p:spPr>
+          <a:xfrm>
+            <a:off x="6214675" y="1762530"/>
+            <a:ext cx="1915169" cy="74901"/>
+          </a:xfrm>
+          <a:prstGeom prst="straightConnector1">
+            <a:avLst/>
+          </a:prstGeom>
+          <a:ln w="19050">
+            <a:solidFill>
+              <a:schemeClr val="tx1"/>
+            </a:solidFill>
+            <a:prstDash val="dash"/>
+            <a:tailEnd type="triangle"/>
+          </a:ln>
+        </p:spPr>
+        <p:style>
+          <a:lnRef idx="1">
+            <a:schemeClr val="accent1"/>
+          </a:lnRef>
+          <a:fillRef idx="0">
+            <a:schemeClr val="accent1"/>
+          </a:fillRef>
+          <a:effectRef idx="0">
+            <a:schemeClr val="accent1"/>
+          </a:effectRef>
+          <a:fontRef idx="minor">
+            <a:schemeClr val="tx1"/>
+          </a:fontRef>
+        </p:style>
+      </p:cxnSp>
+      <p:sp>
+        <p:nvSpPr>
+          <p:cNvPr id="32" name="Rounded Rectangle 66"/>
+          <p:cNvSpPr/>
+          <p:nvPr/>
+        </p:nvSpPr>
+        <p:spPr>
+          <a:xfrm>
+            <a:off x="2102383" y="1379333"/>
+            <a:ext cx="1314600" cy="217035"/>
+          </a:xfrm>
+          <a:prstGeom prst="roundRect">
+            <a:avLst/>
+          </a:prstGeom>
+          <a:noFill/>
+          <a:ln w="25400">
+            <a:solidFill>
+              <a:schemeClr val="tx1"/>
+            </a:solidFill>
+          </a:ln>
+        </p:spPr>
+        <p:style>
+          <a:lnRef idx="2">
+            <a:schemeClr val="accent1">
+              <a:shade val="50000"/>
+            </a:schemeClr>
+          </a:lnRef>
+          <a:fillRef idx="1">
+            <a:schemeClr val="accent1"/>
+          </a:fillRef>
+          <a:effectRef idx="0">
+            <a:schemeClr val="accent1"/>
+          </a:effectRef>
+          <a:fontRef idx="minor">
+            <a:schemeClr val="lt1"/>
+          </a:fontRef>
+        </p:style>
+        <p:txBody>
+          <a:bodyPr rot="0" spcFirstLastPara="0" vertOverflow="overflow" horzOverflow="overflow" vert="horz" wrap="square" lIns="91440" tIns="45720" rIns="91440" bIns="45720" numCol="1" spcCol="0" rtlCol="1" fromWordArt="0" anchor="ctr" anchorCtr="0" forceAA="0" compatLnSpc="1">
+            <a:prstTxWarp prst="textNoShape">
+              <a:avLst/>
+            </a:prstTxWarp>
+            <a:noAutofit/>
+          </a:bodyPr>
+          <a:lstStyle/>
+          <a:p>
+            <a:pPr algn="ctr"/>
+            <a:r>
+              <a:rPr lang="en-US" sz="1200" dirty="0" err="1">
+                <a:solidFill>
+                  <a:schemeClr val="tx1"/>
+                </a:solidFill>
+              </a:rPr>
+              <a:t>AddVehiclePage</a:t>
+            </a:r>
+            <a:endParaRPr lang="he-IL" sz="1200" dirty="0" smtClean="0">
+              <a:solidFill>
+                <a:schemeClr val="tx1"/>
+              </a:solidFill>
+            </a:endParaRPr>
+          </a:p>
+        </p:txBody>
+      </p:sp>
+      <p:cxnSp>
+        <p:nvCxnSpPr>
+          <p:cNvPr id="33" name="Curved Connector 68"/>
+          <p:cNvCxnSpPr>
+            <a:stCxn id="5" idx="2"/>
+            <a:endCxn id="16" idx="0"/>
+          </p:cNvCxnSpPr>
+          <p:nvPr/>
+        </p:nvCxnSpPr>
+        <p:spPr>
+          <a:xfrm rot="5400000">
+            <a:off x="5308547" y="872990"/>
+            <a:ext cx="16588" cy="1795668"/>
+          </a:xfrm>
+          <a:prstGeom prst="curvedConnector3">
+            <a:avLst>
+              <a:gd name="adj1" fmla="val 50000"/>
+            </a:avLst>
+          </a:prstGeom>
+          <a:ln w="19050">
+            <a:solidFill>
+              <a:schemeClr val="tx1"/>
+            </a:solidFill>
+            <a:prstDash val="dash"/>
+            <a:tailEnd type="triangle"/>
+          </a:ln>
+        </p:spPr>
+        <p:style>
+          <a:lnRef idx="1">
+            <a:schemeClr val="accent1"/>
+          </a:lnRef>
+          <a:fillRef idx="0">
+            <a:schemeClr val="accent1"/>
+          </a:fillRef>
+          <a:effectRef idx="0">
+            <a:schemeClr val="accent1"/>
+          </a:effectRef>
+          <a:fontRef idx="minor">
+            <a:schemeClr val="tx1"/>
+          </a:fontRef>
+        </p:style>
+      </p:cxnSp>
+      <p:cxnSp>
+        <p:nvCxnSpPr>
+          <p:cNvPr id="34" name="Curved Connector 69"/>
+          <p:cNvCxnSpPr>
+            <a:stCxn id="5" idx="3"/>
+            <a:endCxn id="21" idx="1"/>
+          </p:cNvCxnSpPr>
+          <p:nvPr/>
+        </p:nvCxnSpPr>
+        <p:spPr>
+          <a:xfrm flipV="1">
+            <a:off x="6947101" y="915070"/>
+            <a:ext cx="2607014" cy="624959"/>
+          </a:xfrm>
+          <a:prstGeom prst="curvedConnector3">
+            <a:avLst>
+              <a:gd name="adj1" fmla="val 16387"/>
+            </a:avLst>
+          </a:prstGeom>
+          <a:ln w="19050">
+            <a:solidFill>
+              <a:schemeClr val="tx1"/>
+            </a:solidFill>
+            <a:prstDash val="dash"/>
+            <a:tailEnd type="triangle"/>
+          </a:ln>
+        </p:spPr>
+        <p:style>
+          <a:lnRef idx="1">
+            <a:schemeClr val="accent1"/>
+          </a:lnRef>
+          <a:fillRef idx="0">
+            <a:schemeClr val="accent1"/>
+          </a:fillRef>
+          <a:effectRef idx="0">
+            <a:schemeClr val="accent1"/>
+          </a:effectRef>
+          <a:fontRef idx="minor">
+            <a:schemeClr val="tx1"/>
+          </a:fontRef>
+        </p:style>
+      </p:cxnSp>
+      <p:cxnSp>
+        <p:nvCxnSpPr>
+          <p:cNvPr id="39" name="Straight Arrow Connector 101"/>
+          <p:cNvCxnSpPr>
+            <a:stCxn id="5" idx="0"/>
+            <a:endCxn id="22" idx="1"/>
+          </p:cNvCxnSpPr>
+          <p:nvPr/>
+        </p:nvCxnSpPr>
+        <p:spPr>
+          <a:xfrm flipV="1">
+            <a:off x="6214675" y="431915"/>
+            <a:ext cx="4098859" cy="885613"/>
+          </a:xfrm>
+          <a:prstGeom prst="straightConnector1">
+            <a:avLst/>
+          </a:prstGeom>
+          <a:ln w="19050">
+            <a:solidFill>
+              <a:schemeClr val="tx1"/>
+            </a:solidFill>
+            <a:prstDash val="dash"/>
+            <a:tailEnd type="triangle"/>
+          </a:ln>
+        </p:spPr>
+        <p:style>
+          <a:lnRef idx="1">
+            <a:schemeClr val="accent1"/>
+          </a:lnRef>
+          <a:fillRef idx="0">
+            <a:schemeClr val="accent1"/>
+          </a:fillRef>
+          <a:effectRef idx="0">
+            <a:schemeClr val="accent1"/>
+          </a:effectRef>
+          <a:fontRef idx="minor">
+            <a:schemeClr val="tx1"/>
+          </a:fontRef>
+        </p:style>
+      </p:cxnSp>
+      <p:cxnSp>
+        <p:nvCxnSpPr>
+          <p:cNvPr id="42" name="Straight Arrow Connector 124"/>
+          <p:cNvCxnSpPr>
+            <a:stCxn id="5" idx="0"/>
+            <a:endCxn id="25" idx="3"/>
+          </p:cNvCxnSpPr>
+          <p:nvPr/>
+        </p:nvCxnSpPr>
+        <p:spPr>
+          <a:xfrm flipH="1" flipV="1">
+            <a:off x="2604798" y="431916"/>
+            <a:ext cx="3609877" cy="885612"/>
+          </a:xfrm>
+          <a:prstGeom prst="straightConnector1">
+            <a:avLst/>
+          </a:prstGeom>
+          <a:ln w="19050">
+            <a:solidFill>
+              <a:schemeClr val="tx1"/>
+            </a:solidFill>
+            <a:prstDash val="dash"/>
+            <a:tailEnd type="triangle"/>
+          </a:ln>
+        </p:spPr>
+        <p:style>
+          <a:lnRef idx="1">
+            <a:schemeClr val="accent1"/>
+          </a:lnRef>
+          <a:fillRef idx="0">
+            <a:schemeClr val="accent1"/>
+          </a:fillRef>
+          <a:effectRef idx="0">
+            <a:schemeClr val="accent1"/>
+          </a:effectRef>
+          <a:fontRef idx="minor">
+            <a:schemeClr val="tx1"/>
+          </a:fontRef>
+        </p:style>
+      </p:cxnSp>
+      <p:cxnSp>
+        <p:nvCxnSpPr>
+          <p:cNvPr id="45" name="Curved Connector 141"/>
+          <p:cNvCxnSpPr>
+            <a:stCxn id="5" idx="2"/>
+            <a:endCxn id="4" idx="0"/>
+          </p:cNvCxnSpPr>
+          <p:nvPr/>
+        </p:nvCxnSpPr>
+        <p:spPr>
+          <a:xfrm rot="5400000">
+            <a:off x="4875068" y="2026215"/>
+            <a:ext cx="1603292" cy="1075922"/>
+          </a:xfrm>
+          <a:prstGeom prst="curvedConnector3">
+            <a:avLst>
+              <a:gd name="adj1" fmla="val 25642"/>
+            </a:avLst>
+          </a:prstGeom>
+          <a:ln w="19050">
+            <a:solidFill>
+              <a:schemeClr val="tx1"/>
+            </a:solidFill>
+            <a:prstDash val="dash"/>
+            <a:tailEnd type="triangle"/>
+          </a:ln>
+        </p:spPr>
+        <p:style>
+          <a:lnRef idx="1">
+            <a:schemeClr val="accent1"/>
+          </a:lnRef>
+          <a:fillRef idx="0">
+            <a:schemeClr val="accent1"/>
+          </a:fillRef>
+          <a:effectRef idx="0">
+            <a:schemeClr val="accent1"/>
+          </a:effectRef>
+          <a:fontRef idx="minor">
+            <a:schemeClr val="tx1"/>
+          </a:fontRef>
+        </p:style>
+      </p:cxnSp>
+      <p:cxnSp>
+        <p:nvCxnSpPr>
+          <p:cNvPr id="77" name="Curved Connector 68"/>
+          <p:cNvCxnSpPr>
+            <a:stCxn id="5" idx="1"/>
+            <a:endCxn id="13" idx="0"/>
+          </p:cNvCxnSpPr>
+          <p:nvPr/>
+        </p:nvCxnSpPr>
+        <p:spPr>
+          <a:xfrm rot="10800000">
+            <a:off x="2302482" y="931215"/>
+            <a:ext cx="3179766" cy="608814"/>
+          </a:xfrm>
+          <a:prstGeom prst="curvedConnector4">
+            <a:avLst>
+              <a:gd name="adj1" fmla="val 35800"/>
+              <a:gd name="adj2" fmla="val 137548"/>
+            </a:avLst>
+          </a:prstGeom>
+          <a:ln w="19050">
+            <a:solidFill>
+              <a:schemeClr val="tx1"/>
+            </a:solidFill>
+            <a:prstDash val="dash"/>
+            <a:tailEnd type="triangle"/>
+          </a:ln>
+        </p:spPr>
+        <p:style>
+          <a:lnRef idx="1">
+            <a:schemeClr val="accent1"/>
+          </a:lnRef>
+          <a:fillRef idx="0">
+            <a:schemeClr val="accent1"/>
+          </a:fillRef>
+          <a:effectRef idx="0">
+            <a:schemeClr val="accent1"/>
+          </a:effectRef>
+          <a:fontRef idx="minor">
+            <a:schemeClr val="tx1"/>
+          </a:fontRef>
+        </p:style>
+      </p:cxnSp>
+      <p:cxnSp>
+        <p:nvCxnSpPr>
+          <p:cNvPr id="138" name="Curved Connector 141"/>
+          <p:cNvCxnSpPr>
+            <a:stCxn id="5" idx="2"/>
+            <a:endCxn id="9" idx="0"/>
+          </p:cNvCxnSpPr>
+          <p:nvPr/>
+        </p:nvCxnSpPr>
+        <p:spPr>
+          <a:xfrm rot="16200000" flipH="1">
+            <a:off x="6131507" y="1845697"/>
+            <a:ext cx="700760" cy="534425"/>
+          </a:xfrm>
+          <a:prstGeom prst="curvedConnector3">
+            <a:avLst>
+              <a:gd name="adj1" fmla="val 50000"/>
+            </a:avLst>
+          </a:prstGeom>
+          <a:ln w="19050">
+            <a:solidFill>
+              <a:schemeClr val="tx1"/>
+            </a:solidFill>
+            <a:prstDash val="dash"/>
+            <a:tailEnd type="triangle"/>
+          </a:ln>
+        </p:spPr>
+        <p:style>
+          <a:lnRef idx="1">
+            <a:schemeClr val="accent1"/>
+          </a:lnRef>
+          <a:fillRef idx="0">
+            <a:schemeClr val="accent1"/>
+          </a:fillRef>
+          <a:effectRef idx="0">
+            <a:schemeClr val="accent1"/>
+          </a:effectRef>
+          <a:fontRef idx="minor">
+            <a:schemeClr val="tx1"/>
+          </a:fontRef>
+        </p:style>
+      </p:cxnSp>
+      <p:cxnSp>
+        <p:nvCxnSpPr>
+          <p:cNvPr id="154" name="Curved Connector 68"/>
+          <p:cNvCxnSpPr>
+            <a:stCxn id="5" idx="3"/>
+            <a:endCxn id="27" idx="1"/>
+          </p:cNvCxnSpPr>
+          <p:nvPr/>
+        </p:nvCxnSpPr>
+        <p:spPr>
+          <a:xfrm flipV="1">
+            <a:off x="6947101" y="1495235"/>
+            <a:ext cx="1350438" cy="44794"/>
+          </a:xfrm>
+          <a:prstGeom prst="curvedConnector3">
+            <a:avLst>
+              <a:gd name="adj1" fmla="val 50000"/>
+            </a:avLst>
+          </a:prstGeom>
+          <a:ln w="19050">
+            <a:solidFill>
+              <a:schemeClr val="tx1"/>
+            </a:solidFill>
+            <a:prstDash val="dash"/>
+            <a:tailEnd type="triangle"/>
+          </a:ln>
+        </p:spPr>
+        <p:style>
+          <a:lnRef idx="1">
+            <a:schemeClr val="accent1"/>
+          </a:lnRef>
+          <a:fillRef idx="0">
+            <a:schemeClr val="accent1"/>
+          </a:fillRef>
+          <a:effectRef idx="0">
+            <a:schemeClr val="accent1"/>
+          </a:effectRef>
+          <a:fontRef idx="minor">
+            <a:schemeClr val="tx1"/>
+          </a:fontRef>
+        </p:style>
+      </p:cxnSp>
+      <p:sp>
+        <p:nvSpPr>
+          <p:cNvPr id="184" name="Rectangle 291"/>
+          <p:cNvSpPr/>
+          <p:nvPr/>
+        </p:nvSpPr>
+        <p:spPr>
+          <a:xfrm>
+            <a:off x="6037723" y="82203"/>
+            <a:ext cx="1989425" cy="325807"/>
+          </a:xfrm>
+          <a:prstGeom prst="rect">
+            <a:avLst/>
+          </a:prstGeom>
+          <a:noFill/>
+          <a:ln w="25400">
+            <a:solidFill>
+              <a:schemeClr val="tx1"/>
+            </a:solidFill>
+          </a:ln>
+        </p:spPr>
+        <p:style>
+          <a:lnRef idx="2">
+            <a:schemeClr val="accent1">
+              <a:shade val="50000"/>
+            </a:schemeClr>
+          </a:lnRef>
+          <a:fillRef idx="1">
+            <a:schemeClr val="accent1"/>
+          </a:fillRef>
+          <a:effectRef idx="0">
+            <a:schemeClr val="accent1"/>
+          </a:effectRef>
+          <a:fontRef idx="minor">
+            <a:schemeClr val="lt1"/>
+          </a:fontRef>
+        </p:style>
+        <p:txBody>
+          <a:bodyPr rtlCol="1" anchor="ctr"/>
+          <a:lstStyle/>
+          <a:p>
+            <a:pPr algn="ctr"/>
+            <a:r>
+              <a:rPr lang="en-US" sz="1200" dirty="0" err="1">
+                <a:solidFill>
+                  <a:schemeClr val="tx1"/>
+                </a:solidFill>
+              </a:rPr>
+              <a:t>ICommunicateWithConsole</a:t>
+            </a:r>
+            <a:endParaRPr lang="he-IL" sz="1200" dirty="0">
+              <a:solidFill>
+                <a:schemeClr val="tx1"/>
+              </a:solidFill>
+            </a:endParaRPr>
+          </a:p>
+        </p:txBody>
+      </p:sp>
+      <p:cxnSp>
+        <p:nvCxnSpPr>
+          <p:cNvPr id="185" name="Straight Arrow Connector 293"/>
+          <p:cNvCxnSpPr>
+            <a:stCxn id="184" idx="2"/>
+            <a:endCxn id="5" idx="0"/>
+          </p:cNvCxnSpPr>
+          <p:nvPr/>
+        </p:nvCxnSpPr>
+        <p:spPr>
+          <a:xfrm flipH="1">
+            <a:off x="6214675" y="408010"/>
+            <a:ext cx="817761" cy="909518"/>
+          </a:xfrm>
+          <a:prstGeom prst="straightConnector1">
+            <a:avLst/>
+          </a:prstGeom>
+          <a:ln w="19050">
+            <a:solidFill>
+              <a:schemeClr val="tx1"/>
+            </a:solidFill>
+            <a:prstDash val="solid"/>
+            <a:tailEnd type="triangle"/>
+          </a:ln>
+        </p:spPr>
+        <p:style>
+          <a:lnRef idx="1">
+            <a:schemeClr val="accent1"/>
+          </a:lnRef>
+          <a:fillRef idx="0">
+            <a:schemeClr val="accent1"/>
+          </a:fillRef>
+          <a:effectRef idx="0">
+            <a:schemeClr val="accent1"/>
+          </a:effectRef>
+          <a:fontRef idx="minor">
+            <a:schemeClr val="tx1"/>
+          </a:fontRef>
+        </p:style>
+      </p:cxnSp>
+      <p:cxnSp>
+        <p:nvCxnSpPr>
+          <p:cNvPr id="207" name="Curved Connector 303"/>
+          <p:cNvCxnSpPr>
+            <a:stCxn id="13" idx="1"/>
+            <a:endCxn id="25" idx="1"/>
+          </p:cNvCxnSpPr>
+          <p:nvPr/>
+        </p:nvCxnSpPr>
+        <p:spPr>
+          <a:xfrm rot="10800000">
+            <a:off x="582422" y="431917"/>
+            <a:ext cx="816994" cy="608251"/>
+          </a:xfrm>
+          <a:prstGeom prst="curvedConnector3">
+            <a:avLst>
+              <a:gd name="adj1" fmla="val 127981"/>
+            </a:avLst>
+          </a:prstGeom>
+          <a:ln w="19050">
+            <a:solidFill>
+              <a:schemeClr val="tx1"/>
+            </a:solidFill>
+            <a:tailEnd type="triangle"/>
+          </a:ln>
+        </p:spPr>
+        <p:style>
+          <a:lnRef idx="1">
+            <a:schemeClr val="accent1"/>
+          </a:lnRef>
+          <a:fillRef idx="0">
+            <a:schemeClr val="accent1"/>
+          </a:fillRef>
+          <a:effectRef idx="0">
+            <a:schemeClr val="accent1"/>
+          </a:effectRef>
+          <a:fontRef idx="minor">
+            <a:schemeClr val="tx1"/>
+          </a:fontRef>
+        </p:style>
+      </p:cxnSp>
+      <p:cxnSp>
+        <p:nvCxnSpPr>
+          <p:cNvPr id="211" name="Curved Connector 303"/>
+          <p:cNvCxnSpPr>
+            <a:stCxn id="32" idx="1"/>
+            <a:endCxn id="13" idx="2"/>
+          </p:cNvCxnSpPr>
+          <p:nvPr/>
+        </p:nvCxnSpPr>
+        <p:spPr>
+          <a:xfrm rot="10800000" flipH="1">
+            <a:off x="2102382" y="1149119"/>
+            <a:ext cx="200099" cy="338732"/>
+          </a:xfrm>
+          <a:prstGeom prst="curvedConnector4">
+            <a:avLst>
+              <a:gd name="adj1" fmla="val -114243"/>
+              <a:gd name="adj2" fmla="val 66018"/>
+            </a:avLst>
+          </a:prstGeom>
+          <a:ln w="19050">
+            <a:solidFill>
+              <a:schemeClr val="tx1"/>
+            </a:solidFill>
+            <a:tailEnd type="triangle"/>
+          </a:ln>
+        </p:spPr>
+        <p:style>
+          <a:lnRef idx="1">
+            <a:schemeClr val="accent1"/>
+          </a:lnRef>
+          <a:fillRef idx="0">
+            <a:schemeClr val="accent1"/>
+          </a:fillRef>
+          <a:effectRef idx="0">
+            <a:schemeClr val="accent1"/>
+          </a:effectRef>
+          <a:fontRef idx="minor">
+            <a:schemeClr val="tx1"/>
+          </a:fontRef>
+        </p:style>
+      </p:cxnSp>
+      <p:cxnSp>
+        <p:nvCxnSpPr>
+          <p:cNvPr id="212" name="Curved Connector 303"/>
+          <p:cNvCxnSpPr>
+            <a:stCxn id="4" idx="1"/>
+            <a:endCxn id="32" idx="2"/>
+          </p:cNvCxnSpPr>
+          <p:nvPr/>
+        </p:nvCxnSpPr>
+        <p:spPr>
+          <a:xfrm rot="10800000">
+            <a:off x="2759683" y="1596368"/>
+            <a:ext cx="1348928" cy="1904818"/>
+          </a:xfrm>
+          <a:prstGeom prst="curvedConnector2">
+            <a:avLst/>
+          </a:prstGeom>
+          <a:ln w="19050">
+            <a:solidFill>
+              <a:schemeClr val="tx1"/>
+            </a:solidFill>
+            <a:tailEnd type="triangle"/>
+          </a:ln>
+        </p:spPr>
+        <p:style>
+          <a:lnRef idx="1">
+            <a:schemeClr val="accent1"/>
+          </a:lnRef>
+          <a:fillRef idx="0">
+            <a:schemeClr val="accent1"/>
+          </a:fillRef>
+          <a:effectRef idx="0">
+            <a:schemeClr val="accent1"/>
+          </a:effectRef>
+          <a:fontRef idx="minor">
+            <a:schemeClr val="tx1"/>
+          </a:fontRef>
+        </p:style>
+      </p:cxnSp>
+      <p:cxnSp>
+        <p:nvCxnSpPr>
+          <p:cNvPr id="213" name="Curved Connector 303"/>
+          <p:cNvCxnSpPr>
+            <a:stCxn id="4" idx="1"/>
+            <a:endCxn id="25" idx="1"/>
+          </p:cNvCxnSpPr>
+          <p:nvPr/>
+        </p:nvCxnSpPr>
+        <p:spPr>
+          <a:xfrm rot="10800000">
+            <a:off x="582423" y="431916"/>
+            <a:ext cx="3526189" cy="3069270"/>
+          </a:xfrm>
+          <a:prstGeom prst="curvedConnector3">
+            <a:avLst>
+              <a:gd name="adj1" fmla="val 106483"/>
+            </a:avLst>
+          </a:prstGeom>
+          <a:ln w="19050">
+            <a:solidFill>
+              <a:schemeClr val="tx1"/>
+            </a:solidFill>
+            <a:tailEnd type="triangle"/>
+          </a:ln>
+        </p:spPr>
+        <p:style>
+          <a:lnRef idx="1">
+            <a:schemeClr val="accent1"/>
+          </a:lnRef>
+          <a:fillRef idx="0">
+            <a:schemeClr val="accent1"/>
+          </a:fillRef>
+          <a:effectRef idx="0">
+            <a:schemeClr val="accent1"/>
+          </a:effectRef>
+          <a:fontRef idx="minor">
+            <a:schemeClr val="tx1"/>
+          </a:fontRef>
+        </p:style>
+      </p:cxnSp>
+      <p:cxnSp>
+        <p:nvCxnSpPr>
+          <p:cNvPr id="214" name="Curved Connector 303"/>
+          <p:cNvCxnSpPr>
+            <a:stCxn id="4" idx="2"/>
+            <a:endCxn id="22" idx="2"/>
+          </p:cNvCxnSpPr>
+          <p:nvPr/>
+        </p:nvCxnSpPr>
+        <p:spPr>
+          <a:xfrm rot="5400000" flipH="1" flipV="1">
+            <a:off x="6530602" y="-868411"/>
+            <a:ext cx="3113111" cy="5896810"/>
+          </a:xfrm>
+          <a:prstGeom prst="curvedConnector3">
+            <a:avLst>
+              <a:gd name="adj1" fmla="val -7343"/>
+            </a:avLst>
+          </a:prstGeom>
+          <a:ln w="19050">
+            <a:solidFill>
+              <a:schemeClr val="tx1"/>
+            </a:solidFill>
+            <a:tailEnd type="triangle"/>
+          </a:ln>
+        </p:spPr>
+        <p:style>
+          <a:lnRef idx="1">
+            <a:schemeClr val="accent1"/>
+          </a:lnRef>
+          <a:fillRef idx="0">
+            <a:schemeClr val="accent1"/>
+          </a:fillRef>
+          <a:effectRef idx="0">
+            <a:schemeClr val="accent1"/>
+          </a:effectRef>
+          <a:fontRef idx="minor">
+            <a:schemeClr val="tx1"/>
+          </a:fontRef>
+        </p:style>
+      </p:cxnSp>
+      <p:cxnSp>
+        <p:nvCxnSpPr>
+          <p:cNvPr id="215" name="Curved Connector 303"/>
+          <p:cNvCxnSpPr>
+            <a:stCxn id="4" idx="3"/>
+            <a:endCxn id="9" idx="2"/>
+          </p:cNvCxnSpPr>
+          <p:nvPr/>
+        </p:nvCxnSpPr>
+        <p:spPr>
+          <a:xfrm flipV="1">
+            <a:off x="6168895" y="2739963"/>
+            <a:ext cx="580205" cy="761223"/>
+          </a:xfrm>
+          <a:prstGeom prst="curvedConnector2">
+            <a:avLst/>
+          </a:prstGeom>
+          <a:ln w="19050">
+            <a:solidFill>
+              <a:schemeClr val="tx1"/>
+            </a:solidFill>
+            <a:tailEnd type="triangle"/>
+          </a:ln>
+        </p:spPr>
+        <p:style>
+          <a:lnRef idx="1">
+            <a:schemeClr val="accent1"/>
+          </a:lnRef>
+          <a:fillRef idx="0">
+            <a:schemeClr val="accent1"/>
+          </a:fillRef>
+          <a:effectRef idx="0">
+            <a:schemeClr val="accent1"/>
+          </a:effectRef>
+          <a:fontRef idx="minor">
+            <a:schemeClr val="tx1"/>
+          </a:fontRef>
+        </p:style>
+      </p:cxnSp>
+      <p:cxnSp>
+        <p:nvCxnSpPr>
+          <p:cNvPr id="216" name="Curved Connector 303"/>
+          <p:cNvCxnSpPr>
+            <a:stCxn id="4" idx="3"/>
+            <a:endCxn id="10" idx="2"/>
+          </p:cNvCxnSpPr>
+          <p:nvPr/>
+        </p:nvCxnSpPr>
+        <p:spPr>
+          <a:xfrm flipV="1">
+            <a:off x="6168895" y="2087361"/>
+            <a:ext cx="1960949" cy="1413825"/>
+          </a:xfrm>
+          <a:prstGeom prst="curvedConnector2">
+            <a:avLst/>
+          </a:prstGeom>
+          <a:ln w="19050">
+            <a:solidFill>
+              <a:schemeClr val="tx1"/>
+            </a:solidFill>
+            <a:tailEnd type="triangle"/>
+          </a:ln>
+        </p:spPr>
+        <p:style>
+          <a:lnRef idx="1">
+            <a:schemeClr val="accent1"/>
+          </a:lnRef>
+          <a:fillRef idx="0">
+            <a:schemeClr val="accent1"/>
+          </a:fillRef>
+          <a:effectRef idx="0">
+            <a:schemeClr val="accent1"/>
+          </a:effectRef>
+          <a:fontRef idx="minor">
+            <a:schemeClr val="tx1"/>
+          </a:fontRef>
+        </p:style>
+      </p:cxnSp>
+      <p:cxnSp>
+        <p:nvCxnSpPr>
+          <p:cNvPr id="217" name="Curved Connector 303"/>
+          <p:cNvCxnSpPr>
+            <a:stCxn id="4" idx="2"/>
+            <a:endCxn id="21" idx="2"/>
+          </p:cNvCxnSpPr>
+          <p:nvPr/>
+        </p:nvCxnSpPr>
+        <p:spPr>
+          <a:xfrm rot="5400000" flipH="1" flipV="1">
+            <a:off x="6388871" y="-204983"/>
+            <a:ext cx="2591413" cy="5091651"/>
+          </a:xfrm>
+          <a:prstGeom prst="curvedConnector3">
+            <a:avLst>
+              <a:gd name="adj1" fmla="val -8821"/>
+            </a:avLst>
+          </a:prstGeom>
+          <a:ln w="19050">
+            <a:solidFill>
+              <a:schemeClr val="tx1"/>
+            </a:solidFill>
+            <a:tailEnd type="triangle"/>
+          </a:ln>
+        </p:spPr>
+        <p:style>
+          <a:lnRef idx="1">
+            <a:schemeClr val="accent1"/>
+          </a:lnRef>
+          <a:fillRef idx="0">
+            <a:schemeClr val="accent1"/>
+          </a:fillRef>
+          <a:effectRef idx="0">
+            <a:schemeClr val="accent1"/>
+          </a:effectRef>
+          <a:fontRef idx="minor">
+            <a:schemeClr val="tx1"/>
+          </a:fontRef>
+        </p:style>
+      </p:cxnSp>
+      <p:cxnSp>
+        <p:nvCxnSpPr>
+          <p:cNvPr id="242" name="Curved Connector 303"/>
+          <p:cNvCxnSpPr>
+            <a:stCxn id="4" idx="2"/>
+            <a:endCxn id="27" idx="2"/>
+          </p:cNvCxnSpPr>
+          <p:nvPr/>
+        </p:nvCxnSpPr>
+        <p:spPr>
+          <a:xfrm rot="5400000" flipH="1" flipV="1">
+            <a:off x="6134004" y="643436"/>
+            <a:ext cx="1997862" cy="3988364"/>
+          </a:xfrm>
+          <a:prstGeom prst="curvedConnector3">
+            <a:avLst>
+              <a:gd name="adj1" fmla="val -11442"/>
+            </a:avLst>
+          </a:prstGeom>
+          <a:ln w="19050">
+            <a:solidFill>
+              <a:schemeClr val="tx1"/>
+            </a:solidFill>
+            <a:tailEnd type="triangle"/>
+          </a:ln>
+        </p:spPr>
+        <p:style>
+          <a:lnRef idx="1">
+            <a:schemeClr val="accent1"/>
+          </a:lnRef>
+          <a:fillRef idx="0">
+            <a:schemeClr val="accent1"/>
+          </a:fillRef>
+          <a:effectRef idx="0">
+            <a:schemeClr val="accent1"/>
+          </a:effectRef>
+          <a:fontRef idx="minor">
+            <a:schemeClr val="tx1"/>
+          </a:fontRef>
+        </p:style>
+      </p:cxnSp>
+      <p:cxnSp>
+        <p:nvCxnSpPr>
+          <p:cNvPr id="310" name="Curved Connector 303"/>
+          <p:cNvCxnSpPr>
+            <a:stCxn id="32" idx="3"/>
+            <a:endCxn id="16" idx="1"/>
+          </p:cNvCxnSpPr>
+          <p:nvPr/>
+        </p:nvCxnSpPr>
+        <p:spPr>
+          <a:xfrm>
+            <a:off x="3416983" y="1487851"/>
+            <a:ext cx="421400" cy="419591"/>
+          </a:xfrm>
+          <a:prstGeom prst="curvedConnector3">
+            <a:avLst>
+              <a:gd name="adj1" fmla="val 50000"/>
+            </a:avLst>
+          </a:prstGeom>
+          <a:ln w="19050">
+            <a:solidFill>
+              <a:schemeClr val="tx1"/>
+            </a:solidFill>
+            <a:tailEnd type="triangle"/>
+          </a:ln>
+        </p:spPr>
+        <p:style>
+          <a:lnRef idx="1">
+            <a:schemeClr val="accent1"/>
+          </a:lnRef>
+          <a:fillRef idx="0">
+            <a:schemeClr val="accent1"/>
+          </a:fillRef>
+          <a:effectRef idx="0">
+            <a:schemeClr val="accent1"/>
+          </a:effectRef>
+          <a:fontRef idx="minor">
+            <a:schemeClr val="tx1"/>
+          </a:fontRef>
+        </p:style>
+      </p:cxnSp>
+    </p:spTree>
+    <p:extLst>
+      <p:ext uri="{BB962C8B-B14F-4D97-AF65-F5344CB8AC3E}">
+        <p14:creationId xmlns:p14="http://schemas.microsoft.com/office/powerpoint/2010/main" val="227253039"/>
+      </p:ext>
+    </p:extLst>
+  </p:cSld>
+  <p:clrMapOvr>
+    <a:masterClrMapping/>
+  </p:clrMapOvr>
+  <p:timing>
+    <p:tnLst>
+      <p:par>
+        <p:cTn id="1" dur="indefinite" restart="never" nodeType="tmRoot"/>
+      </p:par>
+    </p:tnLst>
+  </p:timing>
 </p:sld>
 </file>
 

</xml_diff>